<commit_message>
Updated the presentation... again
</commit_message>
<xml_diff>
--- a/FirearmShopPres.pptx
+++ b/FirearmShopPres.pptx
@@ -12619,7 +12619,7 @@
         </p:nvSpPr>
         <p:spPr>
           <a:xfrm>
-            <a:off x="809939" y="3104050"/>
+            <a:off x="373348" y="3104050"/>
             <a:ext cx="2217000" cy="381900"/>
           </a:xfrm>
           <a:prstGeom prst="rect">
@@ -12661,7 +12661,7 @@
         </p:nvSpPr>
         <p:spPr>
           <a:xfrm>
-            <a:off x="809925" y="3477200"/>
+            <a:off x="414297" y="3477200"/>
             <a:ext cx="2217000" cy="640938"/>
           </a:xfrm>
           <a:prstGeom prst="rect">
@@ -12703,7 +12703,7 @@
         </p:nvSpPr>
         <p:spPr>
           <a:xfrm>
-            <a:off x="3463502" y="3104050"/>
+            <a:off x="4572001" y="3086402"/>
             <a:ext cx="2217000" cy="381900"/>
           </a:xfrm>
           <a:prstGeom prst="rect">
@@ -12745,7 +12745,7 @@
         </p:nvSpPr>
         <p:spPr>
           <a:xfrm>
-            <a:off x="6117052" y="3104050"/>
+            <a:off x="6696942" y="3054975"/>
             <a:ext cx="2217000" cy="381900"/>
           </a:xfrm>
           <a:prstGeom prst="rect">
@@ -12787,8 +12787,8 @@
         </p:nvSpPr>
         <p:spPr>
           <a:xfrm>
-            <a:off x="6117038" y="3477200"/>
-            <a:ext cx="2217000" cy="640938"/>
+            <a:off x="6737891" y="3384019"/>
+            <a:ext cx="2125106" cy="640938"/>
           </a:xfrm>
           <a:prstGeom prst="rect">
             <a:avLst/>
@@ -12856,7 +12856,7 @@
         </p:blipFill>
         <p:spPr>
           <a:xfrm>
-            <a:off x="3922632" y="1795428"/>
+            <a:off x="5031134" y="1779781"/>
             <a:ext cx="1298735" cy="1270832"/>
           </a:xfrm>
           <a:prstGeom prst="rect">
@@ -12886,7 +12886,7 @@
         </p:blipFill>
         <p:spPr>
           <a:xfrm>
-            <a:off x="6712527" y="1910973"/>
+            <a:off x="7225538" y="1837554"/>
             <a:ext cx="1159809" cy="1155287"/>
           </a:xfrm>
           <a:prstGeom prst="rect">
@@ -12916,7 +12916,7 @@
         </p:blipFill>
         <p:spPr>
           <a:xfrm>
-            <a:off x="1271664" y="1911284"/>
+            <a:off x="809925" y="1910973"/>
             <a:ext cx="1159809" cy="1154976"/>
           </a:xfrm>
           <a:prstGeom prst="rect">
@@ -12924,6 +12924,322 @@
           </a:prstGeom>
         </p:spPr>
       </p:pic>
+      <p:pic>
+        <p:nvPicPr>
+          <p:cNvPr id="4" name="Picture 3">
+            <a:extLst>
+              <a:ext uri="{FF2B5EF4-FFF2-40B4-BE49-F238E27FC236}">
+                <a16:creationId xmlns:a16="http://schemas.microsoft.com/office/drawing/2014/main" id="{B9262788-8240-4823-A614-259CFC3F2EEE}"/>
+              </a:ext>
+            </a:extLst>
+          </p:cNvPr>
+          <p:cNvPicPr>
+            <a:picLocks noChangeAspect="1"/>
+          </p:cNvPicPr>
+          <p:nvPr/>
+        </p:nvPicPr>
+        <p:blipFill>
+          <a:blip r:embed="rId6"/>
+          <a:stretch>
+            <a:fillRect/>
+          </a:stretch>
+        </p:blipFill>
+        <p:spPr>
+          <a:xfrm>
+            <a:off x="2547542" y="1294688"/>
+            <a:ext cx="2117898" cy="2117898"/>
+          </a:xfrm>
+          <a:prstGeom prst="rect">
+            <a:avLst/>
+          </a:prstGeom>
+        </p:spPr>
+      </p:pic>
+      <p:sp>
+        <p:nvSpPr>
+          <p:cNvPr id="13" name="Google Shape;191;p33">
+            <a:extLst>
+              <a:ext uri="{FF2B5EF4-FFF2-40B4-BE49-F238E27FC236}">
+                <a16:creationId xmlns:a16="http://schemas.microsoft.com/office/drawing/2014/main" id="{7F480766-BBCD-4D44-8FED-39FA79C7CFA3}"/>
+              </a:ext>
+            </a:extLst>
+          </p:cNvPr>
+          <p:cNvSpPr txBox="1">
+            <a:spLocks/>
+          </p:cNvSpPr>
+          <p:nvPr/>
+        </p:nvSpPr>
+        <p:spPr>
+          <a:xfrm>
+            <a:off x="2559795" y="3095300"/>
+            <a:ext cx="2217000" cy="381900"/>
+          </a:xfrm>
+          <a:prstGeom prst="rect">
+            <a:avLst/>
+          </a:prstGeom>
+          <a:noFill/>
+          <a:ln>
+            <a:noFill/>
+          </a:ln>
+        </p:spPr>
+        <p:txBody>
+          <a:bodyPr spcFirstLastPara="1" wrap="square" lIns="91425" tIns="91425" rIns="91425" bIns="91425" anchor="b" anchorCtr="0">
+            <a:noAutofit/>
+          </a:bodyPr>
+          <a:lstStyle>
+            <a:defPPr marR="0" lvl="0" algn="l" rtl="0">
+              <a:lnSpc>
+                <a:spcPct val="100000"/>
+              </a:lnSpc>
+              <a:spcBef>
+                <a:spcPts val="0"/>
+              </a:spcBef>
+              <a:spcAft>
+                <a:spcPts val="0"/>
+              </a:spcAft>
+            </a:defPPr>
+            <a:lvl1pPr marR="0" lvl="0" algn="ctr" rtl="0">
+              <a:lnSpc>
+                <a:spcPct val="100000"/>
+              </a:lnSpc>
+              <a:spcBef>
+                <a:spcPts val="0"/>
+              </a:spcBef>
+              <a:spcAft>
+                <a:spcPts val="0"/>
+              </a:spcAft>
+              <a:buClr>
+                <a:srgbClr val="06BAD6"/>
+              </a:buClr>
+              <a:buSzPts val="1600"/>
+              <a:buFont typeface="Montserrat ExtraBold"/>
+              <a:buNone/>
+              <a:defRPr sz="1600" b="0" i="0" u="none" strike="noStrike" cap="none">
+                <a:solidFill>
+                  <a:srgbClr val="06BAD6"/>
+                </a:solidFill>
+                <a:latin typeface="Montserrat ExtraBold"/>
+                <a:ea typeface="Montserrat ExtraBold"/>
+                <a:cs typeface="Montserrat ExtraBold"/>
+                <a:sym typeface="Montserrat ExtraBold"/>
+              </a:defRPr>
+            </a:lvl1pPr>
+            <a:lvl2pPr marR="0" lvl="1" algn="ctr" rtl="0">
+              <a:lnSpc>
+                <a:spcPct val="100000"/>
+              </a:lnSpc>
+              <a:spcBef>
+                <a:spcPts val="0"/>
+              </a:spcBef>
+              <a:spcAft>
+                <a:spcPts val="0"/>
+              </a:spcAft>
+              <a:buClr>
+                <a:srgbClr val="06BAD6"/>
+              </a:buClr>
+              <a:buSzPts val="4200"/>
+              <a:buFont typeface="Montserrat Alternates"/>
+              <a:buNone/>
+              <a:defRPr sz="4200" b="1" i="0" u="none" strike="noStrike" cap="none">
+                <a:solidFill>
+                  <a:srgbClr val="06BAD6"/>
+                </a:solidFill>
+                <a:latin typeface="Montserrat Alternates"/>
+                <a:ea typeface="Montserrat Alternates"/>
+                <a:cs typeface="Montserrat Alternates"/>
+                <a:sym typeface="Montserrat Alternates"/>
+              </a:defRPr>
+            </a:lvl2pPr>
+            <a:lvl3pPr marR="0" lvl="2" algn="ctr" rtl="0">
+              <a:lnSpc>
+                <a:spcPct val="100000"/>
+              </a:lnSpc>
+              <a:spcBef>
+                <a:spcPts val="0"/>
+              </a:spcBef>
+              <a:spcAft>
+                <a:spcPts val="0"/>
+              </a:spcAft>
+              <a:buClr>
+                <a:srgbClr val="06BAD6"/>
+              </a:buClr>
+              <a:buSzPts val="4200"/>
+              <a:buFont typeface="Montserrat Alternates"/>
+              <a:buNone/>
+              <a:defRPr sz="4200" b="1" i="0" u="none" strike="noStrike" cap="none">
+                <a:solidFill>
+                  <a:srgbClr val="06BAD6"/>
+                </a:solidFill>
+                <a:latin typeface="Montserrat Alternates"/>
+                <a:ea typeface="Montserrat Alternates"/>
+                <a:cs typeface="Montserrat Alternates"/>
+                <a:sym typeface="Montserrat Alternates"/>
+              </a:defRPr>
+            </a:lvl3pPr>
+            <a:lvl4pPr marR="0" lvl="3" algn="ctr" rtl="0">
+              <a:lnSpc>
+                <a:spcPct val="100000"/>
+              </a:lnSpc>
+              <a:spcBef>
+                <a:spcPts val="0"/>
+              </a:spcBef>
+              <a:spcAft>
+                <a:spcPts val="0"/>
+              </a:spcAft>
+              <a:buClr>
+                <a:srgbClr val="06BAD6"/>
+              </a:buClr>
+              <a:buSzPts val="4200"/>
+              <a:buFont typeface="Montserrat Alternates"/>
+              <a:buNone/>
+              <a:defRPr sz="4200" b="1" i="0" u="none" strike="noStrike" cap="none">
+                <a:solidFill>
+                  <a:srgbClr val="06BAD6"/>
+                </a:solidFill>
+                <a:latin typeface="Montserrat Alternates"/>
+                <a:ea typeface="Montserrat Alternates"/>
+                <a:cs typeface="Montserrat Alternates"/>
+                <a:sym typeface="Montserrat Alternates"/>
+              </a:defRPr>
+            </a:lvl4pPr>
+            <a:lvl5pPr marR="0" lvl="4" algn="ctr" rtl="0">
+              <a:lnSpc>
+                <a:spcPct val="100000"/>
+              </a:lnSpc>
+              <a:spcBef>
+                <a:spcPts val="0"/>
+              </a:spcBef>
+              <a:spcAft>
+                <a:spcPts val="0"/>
+              </a:spcAft>
+              <a:buClr>
+                <a:srgbClr val="06BAD6"/>
+              </a:buClr>
+              <a:buSzPts val="4200"/>
+              <a:buFont typeface="Montserrat Alternates"/>
+              <a:buNone/>
+              <a:defRPr sz="4200" b="1" i="0" u="none" strike="noStrike" cap="none">
+                <a:solidFill>
+                  <a:srgbClr val="06BAD6"/>
+                </a:solidFill>
+                <a:latin typeface="Montserrat Alternates"/>
+                <a:ea typeface="Montserrat Alternates"/>
+                <a:cs typeface="Montserrat Alternates"/>
+                <a:sym typeface="Montserrat Alternates"/>
+              </a:defRPr>
+            </a:lvl5pPr>
+            <a:lvl6pPr marR="0" lvl="5" algn="ctr" rtl="0">
+              <a:lnSpc>
+                <a:spcPct val="100000"/>
+              </a:lnSpc>
+              <a:spcBef>
+                <a:spcPts val="0"/>
+              </a:spcBef>
+              <a:spcAft>
+                <a:spcPts val="0"/>
+              </a:spcAft>
+              <a:buClr>
+                <a:srgbClr val="06BAD6"/>
+              </a:buClr>
+              <a:buSzPts val="4200"/>
+              <a:buFont typeface="Montserrat Alternates"/>
+              <a:buNone/>
+              <a:defRPr sz="4200" b="1" i="0" u="none" strike="noStrike" cap="none">
+                <a:solidFill>
+                  <a:srgbClr val="06BAD6"/>
+                </a:solidFill>
+                <a:latin typeface="Montserrat Alternates"/>
+                <a:ea typeface="Montserrat Alternates"/>
+                <a:cs typeface="Montserrat Alternates"/>
+                <a:sym typeface="Montserrat Alternates"/>
+              </a:defRPr>
+            </a:lvl6pPr>
+            <a:lvl7pPr marR="0" lvl="6" algn="ctr" rtl="0">
+              <a:lnSpc>
+                <a:spcPct val="100000"/>
+              </a:lnSpc>
+              <a:spcBef>
+                <a:spcPts val="0"/>
+              </a:spcBef>
+              <a:spcAft>
+                <a:spcPts val="0"/>
+              </a:spcAft>
+              <a:buClr>
+                <a:srgbClr val="06BAD6"/>
+              </a:buClr>
+              <a:buSzPts val="4200"/>
+              <a:buFont typeface="Montserrat Alternates"/>
+              <a:buNone/>
+              <a:defRPr sz="4200" b="1" i="0" u="none" strike="noStrike" cap="none">
+                <a:solidFill>
+                  <a:srgbClr val="06BAD6"/>
+                </a:solidFill>
+                <a:latin typeface="Montserrat Alternates"/>
+                <a:ea typeface="Montserrat Alternates"/>
+                <a:cs typeface="Montserrat Alternates"/>
+                <a:sym typeface="Montserrat Alternates"/>
+              </a:defRPr>
+            </a:lvl7pPr>
+            <a:lvl8pPr marR="0" lvl="7" algn="ctr" rtl="0">
+              <a:lnSpc>
+                <a:spcPct val="100000"/>
+              </a:lnSpc>
+              <a:spcBef>
+                <a:spcPts val="0"/>
+              </a:spcBef>
+              <a:spcAft>
+                <a:spcPts val="0"/>
+              </a:spcAft>
+              <a:buClr>
+                <a:srgbClr val="06BAD6"/>
+              </a:buClr>
+              <a:buSzPts val="4200"/>
+              <a:buFont typeface="Montserrat Alternates"/>
+              <a:buNone/>
+              <a:defRPr sz="4200" b="1" i="0" u="none" strike="noStrike" cap="none">
+                <a:solidFill>
+                  <a:srgbClr val="06BAD6"/>
+                </a:solidFill>
+                <a:latin typeface="Montserrat Alternates"/>
+                <a:ea typeface="Montserrat Alternates"/>
+                <a:cs typeface="Montserrat Alternates"/>
+                <a:sym typeface="Montserrat Alternates"/>
+              </a:defRPr>
+            </a:lvl8pPr>
+            <a:lvl9pPr marR="0" lvl="8" algn="ctr" rtl="0">
+              <a:lnSpc>
+                <a:spcPct val="100000"/>
+              </a:lnSpc>
+              <a:spcBef>
+                <a:spcPts val="0"/>
+              </a:spcBef>
+              <a:spcAft>
+                <a:spcPts val="0"/>
+              </a:spcAft>
+              <a:buClr>
+                <a:srgbClr val="06BAD6"/>
+              </a:buClr>
+              <a:buSzPts val="4200"/>
+              <a:buFont typeface="Montserrat Alternates"/>
+              <a:buNone/>
+              <a:defRPr sz="4200" b="1" i="0" u="none" strike="noStrike" cap="none">
+                <a:solidFill>
+                  <a:srgbClr val="06BAD6"/>
+                </a:solidFill>
+                <a:latin typeface="Montserrat Alternates"/>
+                <a:ea typeface="Montserrat Alternates"/>
+                <a:cs typeface="Montserrat Alternates"/>
+                <a:sym typeface="Montserrat Alternates"/>
+              </a:defRPr>
+            </a:lvl9pPr>
+          </a:lstStyle>
+          <a:p>
+            <a:r>
+              <a:rPr lang="en-US" dirty="0"/>
+              <a:t>Teams</a:t>
+            </a:r>
+          </a:p>
+        </p:txBody>
+      </p:sp>
     </p:spTree>
   </p:cSld>
   <p:clrMapOvr>

</xml_diff>